<commit_message>
added temp sensor to diagram and schematic
</commit_message>
<xml_diff>
--- a/sprinkler.pptx
+++ b/sprinkler.pptx
@@ -6,8 +6,9 @@
   </p:sldMasterIdLst>
   <p:sldIdLst>
     <p:sldId id="256" r:id="rId2"/>
-    <p:sldId id="257" r:id="rId3"/>
-    <p:sldId id="258" r:id="rId4"/>
+    <p:sldId id="259" r:id="rId3"/>
+    <p:sldId id="257" r:id="rId4"/>
+    <p:sldId id="258" r:id="rId5"/>
   </p:sldIdLst>
   <p:sldSz cx="12192000" cy="6858000"/>
   <p:notesSz cx="6858000" cy="9144000"/>
@@ -245,7 +246,7 @@
           <a:p>
             <a:fld id="{6B60A41F-4BA7-48D7-8E69-C6F0C953ED2F}" type="datetimeFigureOut">
               <a:rPr lang="en-US" smtClean="0"/>
-              <a:t>9/2/2020</a:t>
+              <a:t>8/1/2021</a:t>
             </a:fld>
             <a:endParaRPr lang="en-US"/>
           </a:p>
@@ -415,7 +416,7 @@
           <a:p>
             <a:fld id="{6B60A41F-4BA7-48D7-8E69-C6F0C953ED2F}" type="datetimeFigureOut">
               <a:rPr lang="en-US" smtClean="0"/>
-              <a:t>9/2/2020</a:t>
+              <a:t>8/1/2021</a:t>
             </a:fld>
             <a:endParaRPr lang="en-US"/>
           </a:p>
@@ -595,7 +596,7 @@
           <a:p>
             <a:fld id="{6B60A41F-4BA7-48D7-8E69-C6F0C953ED2F}" type="datetimeFigureOut">
               <a:rPr lang="en-US" smtClean="0"/>
-              <a:t>9/2/2020</a:t>
+              <a:t>8/1/2021</a:t>
             </a:fld>
             <a:endParaRPr lang="en-US"/>
           </a:p>
@@ -765,7 +766,7 @@
           <a:p>
             <a:fld id="{6B60A41F-4BA7-48D7-8E69-C6F0C953ED2F}" type="datetimeFigureOut">
               <a:rPr lang="en-US" smtClean="0"/>
-              <a:t>9/2/2020</a:t>
+              <a:t>8/1/2021</a:t>
             </a:fld>
             <a:endParaRPr lang="en-US"/>
           </a:p>
@@ -1011,7 +1012,7 @@
           <a:p>
             <a:fld id="{6B60A41F-4BA7-48D7-8E69-C6F0C953ED2F}" type="datetimeFigureOut">
               <a:rPr lang="en-US" smtClean="0"/>
-              <a:t>9/2/2020</a:t>
+              <a:t>8/1/2021</a:t>
             </a:fld>
             <a:endParaRPr lang="en-US"/>
           </a:p>
@@ -1243,7 +1244,7 @@
           <a:p>
             <a:fld id="{6B60A41F-4BA7-48D7-8E69-C6F0C953ED2F}" type="datetimeFigureOut">
               <a:rPr lang="en-US" smtClean="0"/>
-              <a:t>9/2/2020</a:t>
+              <a:t>8/1/2021</a:t>
             </a:fld>
             <a:endParaRPr lang="en-US"/>
           </a:p>
@@ -1610,7 +1611,7 @@
           <a:p>
             <a:fld id="{6B60A41F-4BA7-48D7-8E69-C6F0C953ED2F}" type="datetimeFigureOut">
               <a:rPr lang="en-US" smtClean="0"/>
-              <a:t>9/2/2020</a:t>
+              <a:t>8/1/2021</a:t>
             </a:fld>
             <a:endParaRPr lang="en-US"/>
           </a:p>
@@ -1728,7 +1729,7 @@
           <a:p>
             <a:fld id="{6B60A41F-4BA7-48D7-8E69-C6F0C953ED2F}" type="datetimeFigureOut">
               <a:rPr lang="en-US" smtClean="0"/>
-              <a:t>9/2/2020</a:t>
+              <a:t>8/1/2021</a:t>
             </a:fld>
             <a:endParaRPr lang="en-US"/>
           </a:p>
@@ -1823,7 +1824,7 @@
           <a:p>
             <a:fld id="{6B60A41F-4BA7-48D7-8E69-C6F0C953ED2F}" type="datetimeFigureOut">
               <a:rPr lang="en-US" smtClean="0"/>
-              <a:t>9/2/2020</a:t>
+              <a:t>8/1/2021</a:t>
             </a:fld>
             <a:endParaRPr lang="en-US"/>
           </a:p>
@@ -2100,7 +2101,7 @@
           <a:p>
             <a:fld id="{6B60A41F-4BA7-48D7-8E69-C6F0C953ED2F}" type="datetimeFigureOut">
               <a:rPr lang="en-US" smtClean="0"/>
-              <a:t>9/2/2020</a:t>
+              <a:t>8/1/2021</a:t>
             </a:fld>
             <a:endParaRPr lang="en-US"/>
           </a:p>
@@ -2353,7 +2354,7 @@
           <a:p>
             <a:fld id="{6B60A41F-4BA7-48D7-8E69-C6F0C953ED2F}" type="datetimeFigureOut">
               <a:rPr lang="en-US" smtClean="0"/>
-              <a:t>9/2/2020</a:t>
+              <a:t>8/1/2021</a:t>
             </a:fld>
             <a:endParaRPr lang="en-US"/>
           </a:p>
@@ -2566,7 +2567,7 @@
           <a:p>
             <a:fld id="{6B60A41F-4BA7-48D7-8E69-C6F0C953ED2F}" type="datetimeFigureOut">
               <a:rPr lang="en-US" smtClean="0"/>
-              <a:t>9/2/2020</a:t>
+              <a:t>8/1/2021</a:t>
             </a:fld>
             <a:endParaRPr lang="en-US"/>
           </a:p>
@@ -4044,6 +4045,112 @@
           </a:p>
         </p:txBody>
       </p:sp>
+      <p:sp>
+        <p:nvSpPr>
+          <p:cNvPr id="27" name="TextBox 26"/>
+          <p:cNvSpPr txBox="1"/>
+          <p:nvPr/>
+        </p:nvSpPr>
+        <p:spPr>
+          <a:xfrm>
+            <a:off x="3748919" y="255867"/>
+            <a:ext cx="811441" cy="646331"/>
+          </a:xfrm>
+          <a:prstGeom prst="rect">
+            <a:avLst/>
+          </a:prstGeom>
+          <a:noFill/>
+        </p:spPr>
+        <p:txBody>
+          <a:bodyPr wrap="none" rtlCol="0">
+            <a:spAutoFit/>
+          </a:bodyPr>
+          <a:lstStyle/>
+          <a:p>
+            <a:r>
+              <a:rPr lang="en-US" dirty="0" smtClean="0"/>
+              <a:t>TEMP</a:t>
+            </a:r>
+          </a:p>
+          <a:p>
+            <a:r>
+              <a:rPr lang="en-US" dirty="0" smtClean="0"/>
+              <a:t>1 2 3 4</a:t>
+            </a:r>
+            <a:endParaRPr lang="en-US" dirty="0"/>
+          </a:p>
+        </p:txBody>
+      </p:sp>
+      <p:sp>
+        <p:nvSpPr>
+          <p:cNvPr id="28" name="TextBox 27"/>
+          <p:cNvSpPr txBox="1"/>
+          <p:nvPr/>
+        </p:nvSpPr>
+        <p:spPr>
+          <a:xfrm>
+            <a:off x="9964946" y="615920"/>
+            <a:ext cx="1386405" cy="1477328"/>
+          </a:xfrm>
+          <a:prstGeom prst="rect">
+            <a:avLst/>
+          </a:prstGeom>
+          <a:noFill/>
+        </p:spPr>
+        <p:txBody>
+          <a:bodyPr wrap="none" rtlCol="0">
+            <a:spAutoFit/>
+          </a:bodyPr>
+          <a:lstStyle/>
+          <a:p>
+            <a:r>
+              <a:rPr lang="en-US" dirty="0" smtClean="0"/>
+              <a:t>TEMP</a:t>
+            </a:r>
+            <a:endParaRPr lang="en-US" dirty="0" smtClean="0"/>
+          </a:p>
+          <a:p>
+            <a:r>
+              <a:rPr lang="en-US" dirty="0" smtClean="0"/>
+              <a:t>1         black</a:t>
+            </a:r>
+            <a:endParaRPr lang="en-US" dirty="0"/>
+          </a:p>
+          <a:p>
+            <a:r>
+              <a:rPr lang="en-US" dirty="0"/>
+              <a:t>2         </a:t>
+            </a:r>
+            <a:r>
+              <a:rPr lang="en-US" dirty="0" smtClean="0"/>
+              <a:t>red</a:t>
+            </a:r>
+            <a:endParaRPr lang="en-US" dirty="0"/>
+          </a:p>
+          <a:p>
+            <a:r>
+              <a:rPr lang="en-US" dirty="0"/>
+              <a:t>3         </a:t>
+            </a:r>
+            <a:r>
+              <a:rPr lang="en-US" dirty="0" smtClean="0"/>
+              <a:t>N.C.</a:t>
+            </a:r>
+            <a:endParaRPr lang="en-US" dirty="0"/>
+          </a:p>
+          <a:p>
+            <a:r>
+              <a:rPr lang="en-US" dirty="0"/>
+              <a:t>4         </a:t>
+            </a:r>
+            <a:r>
+              <a:rPr lang="en-US" dirty="0" smtClean="0"/>
+              <a:t>yellow</a:t>
+            </a:r>
+            <a:endParaRPr lang="en-US" dirty="0"/>
+          </a:p>
+        </p:txBody>
+      </p:sp>
     </p:spTree>
     <p:extLst>
       <p:ext uri="{BB962C8B-B14F-4D97-AF65-F5344CB8AC3E}">
@@ -4082,6 +4189,1266 @@
         </p:nvSpPr>
         <p:spPr>
           <a:xfrm>
+            <a:off x="1822450" y="828676"/>
+            <a:ext cx="7931150" cy="4804869"/>
+          </a:xfrm>
+          <a:prstGeom prst="rect">
+            <a:avLst/>
+          </a:prstGeom>
+          <a:noFill/>
+        </p:spPr>
+        <p:style>
+          <a:lnRef idx="2">
+            <a:schemeClr val="accent1">
+              <a:shade val="50000"/>
+            </a:schemeClr>
+          </a:lnRef>
+          <a:fillRef idx="1">
+            <a:schemeClr val="accent1"/>
+          </a:fillRef>
+          <a:effectRef idx="0">
+            <a:schemeClr val="accent1"/>
+          </a:effectRef>
+          <a:fontRef idx="minor">
+            <a:schemeClr val="lt1"/>
+          </a:fontRef>
+        </p:style>
+        <p:txBody>
+          <a:bodyPr rtlCol="0" anchor="ctr"/>
+          <a:lstStyle/>
+          <a:p>
+            <a:pPr algn="ctr"/>
+            <a:endParaRPr lang="en-US"/>
+          </a:p>
+        </p:txBody>
+      </p:sp>
+      <p:sp>
+        <p:nvSpPr>
+          <p:cNvPr id="31" name="Rectangle 30"/>
+          <p:cNvSpPr/>
+          <p:nvPr/>
+        </p:nvSpPr>
+        <p:spPr>
+          <a:xfrm>
+            <a:off x="1566041" y="3615564"/>
+            <a:ext cx="1100957" cy="851340"/>
+          </a:xfrm>
+          <a:prstGeom prst="rect">
+            <a:avLst/>
+          </a:prstGeom>
+        </p:spPr>
+        <p:style>
+          <a:lnRef idx="2">
+            <a:schemeClr val="accent1">
+              <a:shade val="50000"/>
+            </a:schemeClr>
+          </a:lnRef>
+          <a:fillRef idx="1">
+            <a:schemeClr val="accent1"/>
+          </a:fillRef>
+          <a:effectRef idx="0">
+            <a:schemeClr val="accent1"/>
+          </a:effectRef>
+          <a:fontRef idx="minor">
+            <a:schemeClr val="lt1"/>
+          </a:fontRef>
+        </p:style>
+        <p:txBody>
+          <a:bodyPr rtlCol="0" anchor="ctr"/>
+          <a:lstStyle/>
+          <a:p>
+            <a:pPr algn="ctr"/>
+            <a:r>
+              <a:rPr lang="en-US" dirty="0" smtClean="0"/>
+              <a:t>24VAC</a:t>
+            </a:r>
+            <a:endParaRPr lang="en-US" dirty="0"/>
+          </a:p>
+        </p:txBody>
+      </p:sp>
+      <p:sp>
+        <p:nvSpPr>
+          <p:cNvPr id="32" name="Rectangle 31"/>
+          <p:cNvSpPr/>
+          <p:nvPr/>
+        </p:nvSpPr>
+        <p:spPr>
+          <a:xfrm>
+            <a:off x="1563414" y="4529964"/>
+            <a:ext cx="1100957" cy="851340"/>
+          </a:xfrm>
+          <a:prstGeom prst="rect">
+            <a:avLst/>
+          </a:prstGeom>
+        </p:spPr>
+        <p:style>
+          <a:lnRef idx="2">
+            <a:schemeClr val="accent1">
+              <a:shade val="50000"/>
+            </a:schemeClr>
+          </a:lnRef>
+          <a:fillRef idx="1">
+            <a:schemeClr val="accent1"/>
+          </a:fillRef>
+          <a:effectRef idx="0">
+            <a:schemeClr val="accent1"/>
+          </a:effectRef>
+          <a:fontRef idx="minor">
+            <a:schemeClr val="lt1"/>
+          </a:fontRef>
+        </p:style>
+        <p:txBody>
+          <a:bodyPr rtlCol="0" anchor="ctr"/>
+          <a:lstStyle/>
+          <a:p>
+            <a:pPr algn="ctr"/>
+            <a:r>
+              <a:rPr lang="en-US" dirty="0" smtClean="0"/>
+              <a:t>RAIN</a:t>
+            </a:r>
+            <a:endParaRPr lang="en-US" dirty="0"/>
+          </a:p>
+        </p:txBody>
+      </p:sp>
+      <p:grpSp>
+        <p:nvGrpSpPr>
+          <p:cNvPr id="36" name="Group 35"/>
+          <p:cNvGrpSpPr/>
+          <p:nvPr/>
+        </p:nvGrpSpPr>
+        <p:grpSpPr>
+          <a:xfrm>
+            <a:off x="1685271" y="888123"/>
+            <a:ext cx="994866" cy="851340"/>
+            <a:chOff x="1685271" y="888123"/>
+            <a:chExt cx="994866" cy="851340"/>
+          </a:xfrm>
+        </p:grpSpPr>
+        <p:sp>
+          <p:nvSpPr>
+            <p:cNvPr id="13" name="Rectangle 12"/>
+            <p:cNvSpPr/>
+            <p:nvPr/>
+          </p:nvSpPr>
+          <p:spPr>
+            <a:xfrm>
+              <a:off x="1685271" y="1166648"/>
+              <a:ext cx="336331" cy="294290"/>
+            </a:xfrm>
+            <a:prstGeom prst="rect">
+              <a:avLst/>
+            </a:prstGeom>
+          </p:spPr>
+          <p:style>
+            <a:lnRef idx="2">
+              <a:schemeClr val="accent1">
+                <a:shade val="50000"/>
+              </a:schemeClr>
+            </a:lnRef>
+            <a:fillRef idx="1">
+              <a:schemeClr val="accent1"/>
+            </a:fillRef>
+            <a:effectRef idx="0">
+              <a:schemeClr val="accent1"/>
+            </a:effectRef>
+            <a:fontRef idx="minor">
+              <a:schemeClr val="lt1"/>
+            </a:fontRef>
+          </p:style>
+          <p:txBody>
+            <a:bodyPr rtlCol="0" anchor="ctr"/>
+            <a:lstStyle/>
+            <a:p>
+              <a:pPr algn="ctr"/>
+              <a:endParaRPr lang="en-US"/>
+            </a:p>
+          </p:txBody>
+        </p:sp>
+        <p:sp>
+          <p:nvSpPr>
+            <p:cNvPr id="33" name="Rectangle 32"/>
+            <p:cNvSpPr/>
+            <p:nvPr/>
+          </p:nvSpPr>
+          <p:spPr>
+            <a:xfrm>
+              <a:off x="1855080" y="888123"/>
+              <a:ext cx="825057" cy="851340"/>
+            </a:xfrm>
+            <a:prstGeom prst="rect">
+              <a:avLst/>
+            </a:prstGeom>
+          </p:spPr>
+          <p:style>
+            <a:lnRef idx="2">
+              <a:schemeClr val="accent1">
+                <a:shade val="50000"/>
+              </a:schemeClr>
+            </a:lnRef>
+            <a:fillRef idx="1">
+              <a:schemeClr val="accent1"/>
+            </a:fillRef>
+            <a:effectRef idx="0">
+              <a:schemeClr val="accent1"/>
+            </a:effectRef>
+            <a:fontRef idx="minor">
+              <a:schemeClr val="lt1"/>
+            </a:fontRef>
+          </p:style>
+          <p:txBody>
+            <a:bodyPr rtlCol="0" anchor="ctr"/>
+            <a:lstStyle/>
+            <a:p>
+              <a:pPr algn="ctr"/>
+              <a:r>
+                <a:rPr lang="en-US" dirty="0" smtClean="0"/>
+                <a:t>UP</a:t>
+              </a:r>
+              <a:endParaRPr lang="en-US" dirty="0"/>
+            </a:p>
+          </p:txBody>
+        </p:sp>
+      </p:grpSp>
+      <p:grpSp>
+        <p:nvGrpSpPr>
+          <p:cNvPr id="37" name="Group 36"/>
+          <p:cNvGrpSpPr/>
+          <p:nvPr/>
+        </p:nvGrpSpPr>
+        <p:grpSpPr>
+          <a:xfrm>
+            <a:off x="1685271" y="1798910"/>
+            <a:ext cx="994866" cy="851340"/>
+            <a:chOff x="1685271" y="888123"/>
+            <a:chExt cx="994866" cy="851340"/>
+          </a:xfrm>
+        </p:grpSpPr>
+        <p:sp>
+          <p:nvSpPr>
+            <p:cNvPr id="39" name="Rectangle 38"/>
+            <p:cNvSpPr/>
+            <p:nvPr/>
+          </p:nvSpPr>
+          <p:spPr>
+            <a:xfrm>
+              <a:off x="1685271" y="1166648"/>
+              <a:ext cx="336331" cy="294290"/>
+            </a:xfrm>
+            <a:prstGeom prst="rect">
+              <a:avLst/>
+            </a:prstGeom>
+          </p:spPr>
+          <p:style>
+            <a:lnRef idx="2">
+              <a:schemeClr val="accent1">
+                <a:shade val="50000"/>
+              </a:schemeClr>
+            </a:lnRef>
+            <a:fillRef idx="1">
+              <a:schemeClr val="accent1"/>
+            </a:fillRef>
+            <a:effectRef idx="0">
+              <a:schemeClr val="accent1"/>
+            </a:effectRef>
+            <a:fontRef idx="minor">
+              <a:schemeClr val="lt1"/>
+            </a:fontRef>
+          </p:style>
+          <p:txBody>
+            <a:bodyPr rtlCol="0" anchor="ctr"/>
+            <a:lstStyle/>
+            <a:p>
+              <a:pPr algn="ctr"/>
+              <a:endParaRPr lang="en-US"/>
+            </a:p>
+          </p:txBody>
+        </p:sp>
+        <p:sp>
+          <p:nvSpPr>
+            <p:cNvPr id="38" name="Rectangle 37"/>
+            <p:cNvSpPr/>
+            <p:nvPr/>
+          </p:nvSpPr>
+          <p:spPr>
+            <a:xfrm>
+              <a:off x="1855080" y="888123"/>
+              <a:ext cx="825057" cy="851340"/>
+            </a:xfrm>
+            <a:prstGeom prst="rect">
+              <a:avLst/>
+            </a:prstGeom>
+          </p:spPr>
+          <p:style>
+            <a:lnRef idx="2">
+              <a:schemeClr val="accent1">
+                <a:shade val="50000"/>
+              </a:schemeClr>
+            </a:lnRef>
+            <a:fillRef idx="1">
+              <a:schemeClr val="accent1"/>
+            </a:fillRef>
+            <a:effectRef idx="0">
+              <a:schemeClr val="accent1"/>
+            </a:effectRef>
+            <a:fontRef idx="minor">
+              <a:schemeClr val="lt1"/>
+            </a:fontRef>
+          </p:style>
+          <p:txBody>
+            <a:bodyPr rtlCol="0" anchor="ctr"/>
+            <a:lstStyle/>
+            <a:p>
+              <a:pPr algn="ctr"/>
+              <a:r>
+                <a:rPr lang="en-US" dirty="0" smtClean="0"/>
+                <a:t>ENTER</a:t>
+              </a:r>
+              <a:endParaRPr lang="en-US" dirty="0"/>
+            </a:p>
+          </p:txBody>
+        </p:sp>
+      </p:grpSp>
+      <p:grpSp>
+        <p:nvGrpSpPr>
+          <p:cNvPr id="40" name="Group 39"/>
+          <p:cNvGrpSpPr/>
+          <p:nvPr/>
+        </p:nvGrpSpPr>
+        <p:grpSpPr>
+          <a:xfrm>
+            <a:off x="1685271" y="2697548"/>
+            <a:ext cx="994866" cy="851340"/>
+            <a:chOff x="1685271" y="888123"/>
+            <a:chExt cx="994866" cy="851340"/>
+          </a:xfrm>
+        </p:grpSpPr>
+        <p:sp>
+          <p:nvSpPr>
+            <p:cNvPr id="42" name="Rectangle 41"/>
+            <p:cNvSpPr/>
+            <p:nvPr/>
+          </p:nvSpPr>
+          <p:spPr>
+            <a:xfrm>
+              <a:off x="1685271" y="1166648"/>
+              <a:ext cx="336331" cy="294290"/>
+            </a:xfrm>
+            <a:prstGeom prst="rect">
+              <a:avLst/>
+            </a:prstGeom>
+          </p:spPr>
+          <p:style>
+            <a:lnRef idx="2">
+              <a:schemeClr val="accent1">
+                <a:shade val="50000"/>
+              </a:schemeClr>
+            </a:lnRef>
+            <a:fillRef idx="1">
+              <a:schemeClr val="accent1"/>
+            </a:fillRef>
+            <a:effectRef idx="0">
+              <a:schemeClr val="accent1"/>
+            </a:effectRef>
+            <a:fontRef idx="minor">
+              <a:schemeClr val="lt1"/>
+            </a:fontRef>
+          </p:style>
+          <p:txBody>
+            <a:bodyPr rtlCol="0" anchor="ctr"/>
+            <a:lstStyle/>
+            <a:p>
+              <a:pPr algn="ctr"/>
+              <a:endParaRPr lang="en-US"/>
+            </a:p>
+          </p:txBody>
+        </p:sp>
+        <p:sp>
+          <p:nvSpPr>
+            <p:cNvPr id="41" name="Rectangle 40"/>
+            <p:cNvSpPr/>
+            <p:nvPr/>
+          </p:nvSpPr>
+          <p:spPr>
+            <a:xfrm>
+              <a:off x="1855080" y="888123"/>
+              <a:ext cx="825057" cy="851340"/>
+            </a:xfrm>
+            <a:prstGeom prst="rect">
+              <a:avLst/>
+            </a:prstGeom>
+          </p:spPr>
+          <p:style>
+            <a:lnRef idx="2">
+              <a:schemeClr val="accent1">
+                <a:shade val="50000"/>
+              </a:schemeClr>
+            </a:lnRef>
+            <a:fillRef idx="1">
+              <a:schemeClr val="accent1"/>
+            </a:fillRef>
+            <a:effectRef idx="0">
+              <a:schemeClr val="accent1"/>
+            </a:effectRef>
+            <a:fontRef idx="minor">
+              <a:schemeClr val="lt1"/>
+            </a:fontRef>
+          </p:style>
+          <p:txBody>
+            <a:bodyPr rtlCol="0" anchor="ctr"/>
+            <a:lstStyle/>
+            <a:p>
+              <a:pPr algn="ctr"/>
+              <a:r>
+                <a:rPr lang="en-US" dirty="0" smtClean="0"/>
+                <a:t>DOWN</a:t>
+              </a:r>
+              <a:endParaRPr lang="en-US" dirty="0"/>
+            </a:p>
+          </p:txBody>
+        </p:sp>
+      </p:grpSp>
+      <p:sp>
+        <p:nvSpPr>
+          <p:cNvPr id="43" name="Rectangle 42"/>
+          <p:cNvSpPr/>
+          <p:nvPr/>
+        </p:nvSpPr>
+        <p:spPr>
+          <a:xfrm>
+            <a:off x="5257252" y="854953"/>
+            <a:ext cx="1061545" cy="1036911"/>
+          </a:xfrm>
+          <a:prstGeom prst="rect">
+            <a:avLst/>
+          </a:prstGeom>
+        </p:spPr>
+        <p:style>
+          <a:lnRef idx="2">
+            <a:schemeClr val="accent1">
+              <a:shade val="50000"/>
+            </a:schemeClr>
+          </a:lnRef>
+          <a:fillRef idx="1">
+            <a:schemeClr val="accent1"/>
+          </a:fillRef>
+          <a:effectRef idx="0">
+            <a:schemeClr val="accent1"/>
+          </a:effectRef>
+          <a:fontRef idx="minor">
+            <a:schemeClr val="lt1"/>
+          </a:fontRef>
+        </p:style>
+        <p:txBody>
+          <a:bodyPr rtlCol="0" anchor="ctr"/>
+          <a:lstStyle/>
+          <a:p>
+            <a:pPr algn="ctr"/>
+            <a:endParaRPr lang="en-US"/>
+          </a:p>
+        </p:txBody>
+      </p:sp>
+      <p:sp>
+        <p:nvSpPr>
+          <p:cNvPr id="44" name="Rectangle 43"/>
+          <p:cNvSpPr/>
+          <p:nvPr/>
+        </p:nvSpPr>
+        <p:spPr>
+          <a:xfrm>
+            <a:off x="7364576" y="1008993"/>
+            <a:ext cx="1061545" cy="1036911"/>
+          </a:xfrm>
+          <a:prstGeom prst="rect">
+            <a:avLst/>
+          </a:prstGeom>
+        </p:spPr>
+        <p:style>
+          <a:lnRef idx="2">
+            <a:schemeClr val="accent1">
+              <a:shade val="50000"/>
+            </a:schemeClr>
+          </a:lnRef>
+          <a:fillRef idx="1">
+            <a:schemeClr val="accent1"/>
+          </a:fillRef>
+          <a:effectRef idx="0">
+            <a:schemeClr val="accent1"/>
+          </a:effectRef>
+          <a:fontRef idx="minor">
+            <a:schemeClr val="lt1"/>
+          </a:fontRef>
+        </p:style>
+        <p:txBody>
+          <a:bodyPr rtlCol="0" anchor="ctr"/>
+          <a:lstStyle/>
+          <a:p>
+            <a:pPr algn="ctr"/>
+            <a:r>
+              <a:rPr lang="en-US" dirty="0" smtClean="0"/>
+              <a:t>Display</a:t>
+            </a:r>
+            <a:endParaRPr lang="en-US" dirty="0"/>
+          </a:p>
+        </p:txBody>
+      </p:sp>
+      <p:sp>
+        <p:nvSpPr>
+          <p:cNvPr id="45" name="Rectangle 44"/>
+          <p:cNvSpPr/>
+          <p:nvPr/>
+        </p:nvSpPr>
+        <p:spPr>
+          <a:xfrm>
+            <a:off x="2862424" y="3097108"/>
+            <a:ext cx="2298155" cy="1036911"/>
+          </a:xfrm>
+          <a:prstGeom prst="rect">
+            <a:avLst/>
+          </a:prstGeom>
+        </p:spPr>
+        <p:style>
+          <a:lnRef idx="2">
+            <a:schemeClr val="accent1">
+              <a:shade val="50000"/>
+            </a:schemeClr>
+          </a:lnRef>
+          <a:fillRef idx="1">
+            <a:schemeClr val="accent1"/>
+          </a:fillRef>
+          <a:effectRef idx="0">
+            <a:schemeClr val="accent1"/>
+          </a:effectRef>
+          <a:fontRef idx="minor">
+            <a:schemeClr val="lt1"/>
+          </a:fontRef>
+        </p:style>
+        <p:txBody>
+          <a:bodyPr rtlCol="0" anchor="ctr"/>
+          <a:lstStyle/>
+          <a:p>
+            <a:pPr algn="ctr"/>
+            <a:endParaRPr lang="en-US"/>
+          </a:p>
+        </p:txBody>
+      </p:sp>
+      <p:sp>
+        <p:nvSpPr>
+          <p:cNvPr id="46" name="Rectangle 45"/>
+          <p:cNvSpPr/>
+          <p:nvPr/>
+        </p:nvSpPr>
+        <p:spPr>
+          <a:xfrm>
+            <a:off x="5257252" y="3086603"/>
+            <a:ext cx="2298155" cy="1036911"/>
+          </a:xfrm>
+          <a:prstGeom prst="rect">
+            <a:avLst/>
+          </a:prstGeom>
+        </p:spPr>
+        <p:style>
+          <a:lnRef idx="2">
+            <a:schemeClr val="accent1">
+              <a:shade val="50000"/>
+            </a:schemeClr>
+          </a:lnRef>
+          <a:fillRef idx="1">
+            <a:schemeClr val="accent1"/>
+          </a:fillRef>
+          <a:effectRef idx="0">
+            <a:schemeClr val="accent1"/>
+          </a:effectRef>
+          <a:fontRef idx="minor">
+            <a:schemeClr val="lt1"/>
+          </a:fontRef>
+        </p:style>
+        <p:txBody>
+          <a:bodyPr rtlCol="0" anchor="ctr"/>
+          <a:lstStyle/>
+          <a:p>
+            <a:pPr algn="ctr"/>
+            <a:endParaRPr lang="en-US"/>
+          </a:p>
+        </p:txBody>
+      </p:sp>
+      <p:sp>
+        <p:nvSpPr>
+          <p:cNvPr id="47" name="Rectangle 46"/>
+          <p:cNvSpPr/>
+          <p:nvPr/>
+        </p:nvSpPr>
+        <p:spPr>
+          <a:xfrm rot="5400000">
+            <a:off x="2616261" y="4955634"/>
+            <a:ext cx="1100957" cy="851340"/>
+          </a:xfrm>
+          <a:prstGeom prst="rect">
+            <a:avLst/>
+          </a:prstGeom>
+        </p:spPr>
+        <p:style>
+          <a:lnRef idx="2">
+            <a:schemeClr val="accent1">
+              <a:shade val="50000"/>
+            </a:schemeClr>
+          </a:lnRef>
+          <a:fillRef idx="1">
+            <a:schemeClr val="accent1"/>
+          </a:fillRef>
+          <a:effectRef idx="0">
+            <a:schemeClr val="accent1"/>
+          </a:effectRef>
+          <a:fontRef idx="minor">
+            <a:schemeClr val="lt1"/>
+          </a:fontRef>
+        </p:style>
+        <p:txBody>
+          <a:bodyPr rtlCol="0" anchor="ctr"/>
+          <a:lstStyle/>
+          <a:p>
+            <a:pPr algn="ctr"/>
+            <a:endParaRPr lang="en-US"/>
+          </a:p>
+        </p:txBody>
+      </p:sp>
+      <p:sp>
+        <p:nvSpPr>
+          <p:cNvPr id="48" name="Rectangle 47"/>
+          <p:cNvSpPr/>
+          <p:nvPr/>
+        </p:nvSpPr>
+        <p:spPr>
+          <a:xfrm rot="5400000">
+            <a:off x="3566410" y="4955635"/>
+            <a:ext cx="1100957" cy="851340"/>
+          </a:xfrm>
+          <a:prstGeom prst="rect">
+            <a:avLst/>
+          </a:prstGeom>
+        </p:spPr>
+        <p:style>
+          <a:lnRef idx="2">
+            <a:schemeClr val="accent1">
+              <a:shade val="50000"/>
+            </a:schemeClr>
+          </a:lnRef>
+          <a:fillRef idx="1">
+            <a:schemeClr val="accent1"/>
+          </a:fillRef>
+          <a:effectRef idx="0">
+            <a:schemeClr val="accent1"/>
+          </a:effectRef>
+          <a:fontRef idx="minor">
+            <a:schemeClr val="lt1"/>
+          </a:fontRef>
+        </p:style>
+        <p:txBody>
+          <a:bodyPr rtlCol="0" anchor="ctr"/>
+          <a:lstStyle/>
+          <a:p>
+            <a:pPr algn="ctr"/>
+            <a:endParaRPr lang="en-US"/>
+          </a:p>
+        </p:txBody>
+      </p:sp>
+      <p:sp>
+        <p:nvSpPr>
+          <p:cNvPr id="49" name="Rectangle 48"/>
+          <p:cNvSpPr/>
+          <p:nvPr/>
+        </p:nvSpPr>
+        <p:spPr>
+          <a:xfrm rot="5400000">
+            <a:off x="4516558" y="4955634"/>
+            <a:ext cx="1100957" cy="851340"/>
+          </a:xfrm>
+          <a:prstGeom prst="rect">
+            <a:avLst/>
+          </a:prstGeom>
+        </p:spPr>
+        <p:style>
+          <a:lnRef idx="2">
+            <a:schemeClr val="accent1">
+              <a:shade val="50000"/>
+            </a:schemeClr>
+          </a:lnRef>
+          <a:fillRef idx="1">
+            <a:schemeClr val="accent1"/>
+          </a:fillRef>
+          <a:effectRef idx="0">
+            <a:schemeClr val="accent1"/>
+          </a:effectRef>
+          <a:fontRef idx="minor">
+            <a:schemeClr val="lt1"/>
+          </a:fontRef>
+        </p:style>
+        <p:txBody>
+          <a:bodyPr rtlCol="0" anchor="ctr"/>
+          <a:lstStyle/>
+          <a:p>
+            <a:pPr algn="ctr"/>
+            <a:endParaRPr lang="en-US"/>
+          </a:p>
+        </p:txBody>
+      </p:sp>
+      <p:sp>
+        <p:nvSpPr>
+          <p:cNvPr id="50" name="Rectangle 49"/>
+          <p:cNvSpPr/>
+          <p:nvPr/>
+        </p:nvSpPr>
+        <p:spPr>
+          <a:xfrm rot="5400000">
+            <a:off x="5466707" y="4955635"/>
+            <a:ext cx="1100957" cy="851340"/>
+          </a:xfrm>
+          <a:prstGeom prst="rect">
+            <a:avLst/>
+          </a:prstGeom>
+        </p:spPr>
+        <p:style>
+          <a:lnRef idx="2">
+            <a:schemeClr val="accent1">
+              <a:shade val="50000"/>
+            </a:schemeClr>
+          </a:lnRef>
+          <a:fillRef idx="1">
+            <a:schemeClr val="accent1"/>
+          </a:fillRef>
+          <a:effectRef idx="0">
+            <a:schemeClr val="accent1"/>
+          </a:effectRef>
+          <a:fontRef idx="minor">
+            <a:schemeClr val="lt1"/>
+          </a:fontRef>
+        </p:style>
+        <p:txBody>
+          <a:bodyPr rtlCol="0" anchor="ctr"/>
+          <a:lstStyle/>
+          <a:p>
+            <a:pPr algn="ctr"/>
+            <a:endParaRPr lang="en-US"/>
+          </a:p>
+        </p:txBody>
+      </p:sp>
+      <p:sp>
+        <p:nvSpPr>
+          <p:cNvPr id="51" name="Rectangle 50"/>
+          <p:cNvSpPr/>
+          <p:nvPr/>
+        </p:nvSpPr>
+        <p:spPr>
+          <a:xfrm rot="5400000">
+            <a:off x="6406346" y="4963765"/>
+            <a:ext cx="1100957" cy="851340"/>
+          </a:xfrm>
+          <a:prstGeom prst="rect">
+            <a:avLst/>
+          </a:prstGeom>
+        </p:spPr>
+        <p:style>
+          <a:lnRef idx="2">
+            <a:schemeClr val="accent1">
+              <a:shade val="50000"/>
+            </a:schemeClr>
+          </a:lnRef>
+          <a:fillRef idx="1">
+            <a:schemeClr val="accent1"/>
+          </a:fillRef>
+          <a:effectRef idx="0">
+            <a:schemeClr val="accent1"/>
+          </a:effectRef>
+          <a:fontRef idx="minor">
+            <a:schemeClr val="lt1"/>
+          </a:fontRef>
+        </p:style>
+        <p:txBody>
+          <a:bodyPr rtlCol="0" anchor="ctr"/>
+          <a:lstStyle/>
+          <a:p>
+            <a:pPr algn="ctr"/>
+            <a:endParaRPr lang="en-US"/>
+          </a:p>
+        </p:txBody>
+      </p:sp>
+      <p:sp>
+        <p:nvSpPr>
+          <p:cNvPr id="52" name="Rectangle 51"/>
+          <p:cNvSpPr/>
+          <p:nvPr/>
+        </p:nvSpPr>
+        <p:spPr>
+          <a:xfrm rot="5400000">
+            <a:off x="7335475" y="4963766"/>
+            <a:ext cx="1100957" cy="851340"/>
+          </a:xfrm>
+          <a:prstGeom prst="rect">
+            <a:avLst/>
+          </a:prstGeom>
+        </p:spPr>
+        <p:style>
+          <a:lnRef idx="2">
+            <a:schemeClr val="accent1">
+              <a:shade val="50000"/>
+            </a:schemeClr>
+          </a:lnRef>
+          <a:fillRef idx="1">
+            <a:schemeClr val="accent1"/>
+          </a:fillRef>
+          <a:effectRef idx="0">
+            <a:schemeClr val="accent1"/>
+          </a:effectRef>
+          <a:fontRef idx="minor">
+            <a:schemeClr val="lt1"/>
+          </a:fontRef>
+        </p:style>
+        <p:txBody>
+          <a:bodyPr rtlCol="0" anchor="ctr"/>
+          <a:lstStyle/>
+          <a:p>
+            <a:pPr algn="ctr"/>
+            <a:endParaRPr lang="en-US"/>
+          </a:p>
+        </p:txBody>
+      </p:sp>
+      <p:sp>
+        <p:nvSpPr>
+          <p:cNvPr id="55" name="Rectangle 54"/>
+          <p:cNvSpPr/>
+          <p:nvPr/>
+        </p:nvSpPr>
+        <p:spPr>
+          <a:xfrm>
+            <a:off x="8604364" y="3793666"/>
+            <a:ext cx="518616" cy="1037159"/>
+          </a:xfrm>
+          <a:prstGeom prst="rect">
+            <a:avLst/>
+          </a:prstGeom>
+        </p:spPr>
+        <p:style>
+          <a:lnRef idx="2">
+            <a:schemeClr val="accent1">
+              <a:shade val="50000"/>
+            </a:schemeClr>
+          </a:lnRef>
+          <a:fillRef idx="1">
+            <a:schemeClr val="accent1"/>
+          </a:fillRef>
+          <a:effectRef idx="0">
+            <a:schemeClr val="accent1"/>
+          </a:effectRef>
+          <a:fontRef idx="minor">
+            <a:schemeClr val="lt1"/>
+          </a:fontRef>
+        </p:style>
+        <p:txBody>
+          <a:bodyPr rtlCol="0" anchor="ctr"/>
+          <a:lstStyle/>
+          <a:p>
+            <a:pPr algn="ctr"/>
+            <a:endParaRPr lang="en-US"/>
+          </a:p>
+        </p:txBody>
+      </p:sp>
+      <p:sp>
+        <p:nvSpPr>
+          <p:cNvPr id="56" name="Rectangle 55"/>
+          <p:cNvSpPr/>
+          <p:nvPr/>
+        </p:nvSpPr>
+        <p:spPr>
+          <a:xfrm>
+            <a:off x="8881240" y="2976073"/>
+            <a:ext cx="256410" cy="533452"/>
+          </a:xfrm>
+          <a:prstGeom prst="rect">
+            <a:avLst/>
+          </a:prstGeom>
+        </p:spPr>
+        <p:style>
+          <a:lnRef idx="2">
+            <a:schemeClr val="accent1">
+              <a:shade val="50000"/>
+            </a:schemeClr>
+          </a:lnRef>
+          <a:fillRef idx="1">
+            <a:schemeClr val="accent1"/>
+          </a:fillRef>
+          <a:effectRef idx="0">
+            <a:schemeClr val="accent1"/>
+          </a:effectRef>
+          <a:fontRef idx="minor">
+            <a:schemeClr val="lt1"/>
+          </a:fontRef>
+        </p:style>
+        <p:txBody>
+          <a:bodyPr rtlCol="0" anchor="ctr"/>
+          <a:lstStyle/>
+          <a:p>
+            <a:pPr algn="ctr"/>
+            <a:endParaRPr lang="en-US"/>
+          </a:p>
+        </p:txBody>
+      </p:sp>
+      <p:sp>
+        <p:nvSpPr>
+          <p:cNvPr id="57" name="Rectangle 56"/>
+          <p:cNvSpPr/>
+          <p:nvPr/>
+        </p:nvSpPr>
+        <p:spPr>
+          <a:xfrm>
+            <a:off x="8604365" y="2697548"/>
+            <a:ext cx="276876" cy="811977"/>
+          </a:xfrm>
+          <a:prstGeom prst="rect">
+            <a:avLst/>
+          </a:prstGeom>
+        </p:spPr>
+        <p:style>
+          <a:lnRef idx="2">
+            <a:schemeClr val="accent1">
+              <a:shade val="50000"/>
+            </a:schemeClr>
+          </a:lnRef>
+          <a:fillRef idx="1">
+            <a:schemeClr val="accent1"/>
+          </a:fillRef>
+          <a:effectRef idx="0">
+            <a:schemeClr val="accent1"/>
+          </a:effectRef>
+          <a:fontRef idx="minor">
+            <a:schemeClr val="lt1"/>
+          </a:fontRef>
+        </p:style>
+        <p:txBody>
+          <a:bodyPr rtlCol="0" anchor="ctr"/>
+          <a:lstStyle/>
+          <a:p>
+            <a:pPr algn="ctr"/>
+            <a:endParaRPr lang="en-US"/>
+          </a:p>
+        </p:txBody>
+      </p:sp>
+      <p:sp>
+        <p:nvSpPr>
+          <p:cNvPr id="58" name="Rectangle 57"/>
+          <p:cNvSpPr/>
+          <p:nvPr/>
+        </p:nvSpPr>
+        <p:spPr>
+          <a:xfrm>
+            <a:off x="8879705" y="2457494"/>
+            <a:ext cx="256410" cy="533452"/>
+          </a:xfrm>
+          <a:prstGeom prst="rect">
+            <a:avLst/>
+          </a:prstGeom>
+        </p:spPr>
+        <p:style>
+          <a:lnRef idx="2">
+            <a:schemeClr val="accent1">
+              <a:shade val="50000"/>
+            </a:schemeClr>
+          </a:lnRef>
+          <a:fillRef idx="1">
+            <a:schemeClr val="accent1"/>
+          </a:fillRef>
+          <a:effectRef idx="0">
+            <a:schemeClr val="accent1"/>
+          </a:effectRef>
+          <a:fontRef idx="minor">
+            <a:schemeClr val="lt1"/>
+          </a:fontRef>
+        </p:style>
+        <p:txBody>
+          <a:bodyPr rtlCol="0" anchor="ctr"/>
+          <a:lstStyle/>
+          <a:p>
+            <a:pPr algn="ctr"/>
+            <a:endParaRPr lang="en-US"/>
+          </a:p>
+        </p:txBody>
+      </p:sp>
+      <p:sp>
+        <p:nvSpPr>
+          <p:cNvPr id="59" name="Rectangle 58"/>
+          <p:cNvSpPr/>
+          <p:nvPr/>
+        </p:nvSpPr>
+        <p:spPr>
+          <a:xfrm>
+            <a:off x="8742803" y="3867809"/>
+            <a:ext cx="2314080" cy="889446"/>
+          </a:xfrm>
+          <a:prstGeom prst="rect">
+            <a:avLst/>
+          </a:prstGeom>
+        </p:spPr>
+        <p:style>
+          <a:lnRef idx="2">
+            <a:schemeClr val="accent1">
+              <a:shade val="50000"/>
+            </a:schemeClr>
+          </a:lnRef>
+          <a:fillRef idx="1">
+            <a:schemeClr val="accent1"/>
+          </a:fillRef>
+          <a:effectRef idx="0">
+            <a:schemeClr val="accent1"/>
+          </a:effectRef>
+          <a:fontRef idx="minor">
+            <a:schemeClr val="lt1"/>
+          </a:fontRef>
+        </p:style>
+        <p:txBody>
+          <a:bodyPr rtlCol="0" anchor="ctr"/>
+          <a:lstStyle/>
+          <a:p>
+            <a:pPr algn="ctr"/>
+            <a:r>
+              <a:rPr lang="en-US" sz="3600" dirty="0" smtClean="0"/>
+              <a:t>CPU</a:t>
+            </a:r>
+          </a:p>
+        </p:txBody>
+      </p:sp>
+      <p:sp>
+        <p:nvSpPr>
+          <p:cNvPr id="60" name="TextBox 59"/>
+          <p:cNvSpPr txBox="1"/>
+          <p:nvPr/>
+        </p:nvSpPr>
+        <p:spPr>
+          <a:xfrm>
+            <a:off x="6820194" y="935420"/>
+            <a:ext cx="622286" cy="1200329"/>
+          </a:xfrm>
+          <a:prstGeom prst="rect">
+            <a:avLst/>
+          </a:prstGeom>
+          <a:noFill/>
+        </p:spPr>
+        <p:txBody>
+          <a:bodyPr wrap="none" rtlCol="0">
+            <a:spAutoFit/>
+          </a:bodyPr>
+          <a:lstStyle/>
+          <a:p>
+            <a:r>
+              <a:rPr lang="en-US" dirty="0" smtClean="0"/>
+              <a:t>GND</a:t>
+            </a:r>
+          </a:p>
+          <a:p>
+            <a:r>
+              <a:rPr lang="en-US" dirty="0" smtClean="0"/>
+              <a:t>VCC</a:t>
+            </a:r>
+          </a:p>
+          <a:p>
+            <a:r>
+              <a:rPr lang="en-US" dirty="0" smtClean="0"/>
+              <a:t>SDA</a:t>
+            </a:r>
+          </a:p>
+          <a:p>
+            <a:r>
+              <a:rPr lang="en-US" dirty="0" smtClean="0"/>
+              <a:t>SCL</a:t>
+            </a:r>
+            <a:endParaRPr lang="en-US" dirty="0"/>
+          </a:p>
+        </p:txBody>
+      </p:sp>
+      <p:sp>
+        <p:nvSpPr>
+          <p:cNvPr id="61" name="TextBox 60"/>
+          <p:cNvSpPr txBox="1"/>
+          <p:nvPr/>
+        </p:nvSpPr>
+        <p:spPr>
+          <a:xfrm rot="16200000">
+            <a:off x="5478999" y="1535676"/>
+            <a:ext cx="622286" cy="1200329"/>
+          </a:xfrm>
+          <a:prstGeom prst="rect">
+            <a:avLst/>
+          </a:prstGeom>
+          <a:noFill/>
+        </p:spPr>
+        <p:txBody>
+          <a:bodyPr wrap="none" rtlCol="0">
+            <a:spAutoFit/>
+          </a:bodyPr>
+          <a:lstStyle/>
+          <a:p>
+            <a:r>
+              <a:rPr lang="en-US" dirty="0" smtClean="0"/>
+              <a:t>GND</a:t>
+            </a:r>
+          </a:p>
+          <a:p>
+            <a:r>
+              <a:rPr lang="en-US" dirty="0" smtClean="0"/>
+              <a:t>VCC</a:t>
+            </a:r>
+          </a:p>
+          <a:p>
+            <a:r>
+              <a:rPr lang="en-US" dirty="0" smtClean="0"/>
+              <a:t>N.C.</a:t>
+            </a:r>
+          </a:p>
+          <a:p>
+            <a:r>
+              <a:rPr lang="en-US" dirty="0" smtClean="0"/>
+              <a:t>SIG</a:t>
+            </a:r>
+            <a:endParaRPr lang="en-US" dirty="0"/>
+          </a:p>
+        </p:txBody>
+      </p:sp>
+      <p:sp>
+        <p:nvSpPr>
+          <p:cNvPr id="62" name="TextBox 61"/>
+          <p:cNvSpPr txBox="1"/>
+          <p:nvPr/>
+        </p:nvSpPr>
+        <p:spPr>
+          <a:xfrm>
+            <a:off x="9144004" y="2555662"/>
+            <a:ext cx="1447384" cy="369332"/>
+          </a:xfrm>
+          <a:prstGeom prst="rect">
+            <a:avLst/>
+          </a:prstGeom>
+          <a:noFill/>
+        </p:spPr>
+        <p:txBody>
+          <a:bodyPr wrap="none" rtlCol="0">
+            <a:spAutoFit/>
+          </a:bodyPr>
+          <a:lstStyle/>
+          <a:p>
+            <a:r>
+              <a:rPr lang="en-US" dirty="0" smtClean="0"/>
+              <a:t>24VAC switch</a:t>
+            </a:r>
+            <a:endParaRPr lang="en-US" dirty="0"/>
+          </a:p>
+        </p:txBody>
+      </p:sp>
+      <p:sp>
+        <p:nvSpPr>
+          <p:cNvPr id="63" name="TextBox 62"/>
+          <p:cNvSpPr txBox="1"/>
+          <p:nvPr/>
+        </p:nvSpPr>
+        <p:spPr>
+          <a:xfrm>
+            <a:off x="9137296" y="3089202"/>
+            <a:ext cx="1214179" cy="369332"/>
+          </a:xfrm>
+          <a:prstGeom prst="rect">
+            <a:avLst/>
+          </a:prstGeom>
+          <a:noFill/>
+        </p:spPr>
+        <p:txBody>
+          <a:bodyPr wrap="none" rtlCol="0">
+            <a:spAutoFit/>
+          </a:bodyPr>
+          <a:lstStyle/>
+          <a:p>
+            <a:r>
+              <a:rPr lang="en-US" dirty="0" smtClean="0"/>
+              <a:t>VCC switch</a:t>
+            </a:r>
+            <a:endParaRPr lang="en-US" dirty="0"/>
+          </a:p>
+        </p:txBody>
+      </p:sp>
+      <p:sp>
+        <p:nvSpPr>
+          <p:cNvPr id="64" name="TextBox 63"/>
+          <p:cNvSpPr txBox="1"/>
+          <p:nvPr/>
+        </p:nvSpPr>
+        <p:spPr>
+          <a:xfrm>
+            <a:off x="8044650" y="2653858"/>
+            <a:ext cx="622286" cy="923330"/>
+          </a:xfrm>
+          <a:prstGeom prst="rect">
+            <a:avLst/>
+          </a:prstGeom>
+          <a:noFill/>
+        </p:spPr>
+        <p:txBody>
+          <a:bodyPr wrap="none" rtlCol="0">
+            <a:spAutoFit/>
+          </a:bodyPr>
+          <a:lstStyle/>
+          <a:p>
+            <a:r>
+              <a:rPr lang="en-US" dirty="0" smtClean="0"/>
+              <a:t>GND</a:t>
+            </a:r>
+          </a:p>
+          <a:p>
+            <a:r>
+              <a:rPr lang="en-US" dirty="0" smtClean="0"/>
+              <a:t>RX</a:t>
+            </a:r>
+          </a:p>
+          <a:p>
+            <a:r>
+              <a:rPr lang="en-US" dirty="0" smtClean="0"/>
+              <a:t>TX</a:t>
+            </a:r>
+          </a:p>
+        </p:txBody>
+      </p:sp>
+    </p:spTree>
+    <p:extLst>
+      <p:ext uri="{BB962C8B-B14F-4D97-AF65-F5344CB8AC3E}">
+        <p14:creationId xmlns:p14="http://schemas.microsoft.com/office/powerpoint/2010/main" val="1004849566"/>
+      </p:ext>
+    </p:extLst>
+  </p:cSld>
+  <p:clrMapOvr>
+    <a:masterClrMapping/>
+  </p:clrMapOvr>
+</p:sld>
+</file>
+
+<file path=ppt/slides/slide3.xml><?xml version="1.0" encoding="utf-8"?>
+<p:sld xmlns:a="http://schemas.openxmlformats.org/drawingml/2006/main" xmlns:r="http://schemas.openxmlformats.org/officeDocument/2006/relationships" xmlns:p="http://schemas.openxmlformats.org/presentationml/2006/main">
+  <p:cSld>
+    <p:spTree>
+      <p:nvGrpSpPr>
+        <p:cNvPr id="1" name=""/>
+        <p:cNvGrpSpPr/>
+        <p:nvPr/>
+      </p:nvGrpSpPr>
+      <p:grpSpPr>
+        <a:xfrm>
+          <a:off x="0" y="0"/>
+          <a:ext cx="0" cy="0"/>
+          <a:chOff x="0" y="0"/>
+          <a:chExt cx="0" cy="0"/>
+        </a:xfrm>
+      </p:grpSpPr>
+      <p:sp>
+        <p:nvSpPr>
+          <p:cNvPr id="4" name="Rectangle 3"/>
+          <p:cNvSpPr/>
+          <p:nvPr/>
+        </p:nvSpPr>
+        <p:spPr>
+          <a:xfrm>
             <a:off x="778933" y="1997839"/>
             <a:ext cx="8365067" cy="3416320"/>
           </a:xfrm>
@@ -4235,7 +5602,7 @@
 </p:sld>
 </file>
 
-<file path=ppt/slides/slide3.xml><?xml version="1.0" encoding="utf-8"?>
+<file path=ppt/slides/slide4.xml><?xml version="1.0" encoding="utf-8"?>
 <p:sld xmlns:a="http://schemas.openxmlformats.org/drawingml/2006/main" xmlns:r="http://schemas.openxmlformats.org/officeDocument/2006/relationships" xmlns:p="http://schemas.openxmlformats.org/presentationml/2006/main">
   <p:cSld>
     <p:spTree>

</xml_diff>

<commit_message>
add temp sensor to code
</commit_message>
<xml_diff>
--- a/sprinkler.pptx
+++ b/sprinkler.pptx
@@ -4107,7 +4107,6 @@
               <a:rPr lang="en-US" dirty="0" smtClean="0"/>
               <a:t>TEMP</a:t>
             </a:r>
-            <a:endParaRPr lang="en-US" dirty="0" smtClean="0"/>
           </a:p>
           <a:p>
             <a:r>
@@ -5244,8 +5243,9 @@
           <a:p>
             <a:r>
               <a:rPr lang="en-US" dirty="0" smtClean="0"/>
-              <a:t>VCC</a:t>
-            </a:r>
+              <a:t>5V</a:t>
+            </a:r>
+            <a:endParaRPr lang="en-US" dirty="0" smtClean="0"/>
           </a:p>
           <a:p>
             <a:r>
@@ -5292,8 +5292,9 @@
           <a:p>
             <a:r>
               <a:rPr lang="en-US" dirty="0" smtClean="0"/>
-              <a:t>VCC</a:t>
-            </a:r>
+              <a:t>3.3V</a:t>
+            </a:r>
+            <a:endParaRPr lang="en-US" dirty="0" smtClean="0"/>
           </a:p>
           <a:p>
             <a:r>
@@ -5349,7 +5350,7 @@
         <p:spPr>
           <a:xfrm>
             <a:off x="9137296" y="3089202"/>
-            <a:ext cx="1214179" cy="369332"/>
+            <a:ext cx="1086388" cy="369332"/>
           </a:xfrm>
           <a:prstGeom prst="rect">
             <a:avLst/>
@@ -5364,7 +5365,11 @@
           <a:p>
             <a:r>
               <a:rPr lang="en-US" dirty="0" smtClean="0"/>
-              <a:t>VCC switch</a:t>
+              <a:t>5V </a:t>
+            </a:r>
+            <a:r>
+              <a:rPr lang="en-US" dirty="0" smtClean="0"/>
+              <a:t>switch</a:t>
             </a:r>
             <a:endParaRPr lang="en-US" dirty="0"/>
           </a:p>

</xml_diff>